<commit_message>
update video link and presentation slides
</commit_message>
<xml_diff>
--- a/documents/report/CSCI5253-Final-Presentation.pptx
+++ b/documents/report/CSCI5253-Final-Presentation.pptx
@@ -1075,6 +1075,90 @@
 </file>
 
 <file path=ppt/notesSlides/notesSlide14.xml><?xml version="1.0" encoding="utf-8"?>
+<p:notes xmlns:a="http://schemas.openxmlformats.org/drawingml/2006/main" xmlns:r="http://schemas.openxmlformats.org/officeDocument/2006/relationships" xmlns:p="http://schemas.openxmlformats.org/presentationml/2006/main">
+  <p:cSld>
+    <p:spTree>
+      <p:nvGrpSpPr>
+        <p:cNvPr id="1" name=""/>
+        <p:cNvGrpSpPr/>
+        <p:nvPr/>
+      </p:nvGrpSpPr>
+      <p:grpSpPr>
+        <a:xfrm>
+          <a:off x="0" y="0"/>
+          <a:ext cx="0" cy="0"/>
+          <a:chOff x="0" y="0"/>
+          <a:chExt cx="0" cy="0"/>
+        </a:xfrm>
+      </p:grpSpPr>
+      <p:sp>
+        <p:nvSpPr>
+          <p:cNvPr id="2" name="Slide Image Placeholder 1"/>
+          <p:cNvSpPr>
+            <a:spLocks noGrp="1" noRot="1" noChangeAspect="1"/>
+          </p:cNvSpPr>
+          <p:nvPr>
+            <p:ph type="sldImg"/>
+          </p:nvPr>
+        </p:nvSpPr>
+        <p:spPr/>
+      </p:sp>
+      <p:sp>
+        <p:nvSpPr>
+          <p:cNvPr id="3" name="Notes Placeholder 2"/>
+          <p:cNvSpPr>
+            <a:spLocks noGrp="1"/>
+          </p:cNvSpPr>
+          <p:nvPr>
+            <p:ph type="body" idx="1"/>
+          </p:nvPr>
+        </p:nvSpPr>
+        <p:spPr/>
+        <p:txBody>
+          <a:bodyPr/>
+          <a:lstStyle/>
+          <a:p>
+            <a:endParaRPr lang="en-US" dirty="0"/>
+          </a:p>
+        </p:txBody>
+      </p:sp>
+      <p:sp>
+        <p:nvSpPr>
+          <p:cNvPr id="4" name="Slide Number Placeholder 3"/>
+          <p:cNvSpPr>
+            <a:spLocks noGrp="1"/>
+          </p:cNvSpPr>
+          <p:nvPr>
+            <p:ph type="sldNum" sz="quarter" idx="5"/>
+          </p:nvPr>
+        </p:nvSpPr>
+        <p:spPr/>
+        <p:txBody>
+          <a:bodyPr/>
+          <a:lstStyle/>
+          <a:p>
+            <a:fld id="{0CBCAA37-5393-441C-B54C-F75E3C58BE2D}" type="slidenum">
+              <a:rPr lang="en-US" smtClean="0"/>
+              <a:t>14</a:t>
+            </a:fld>
+            <a:endParaRPr lang="en-US"/>
+          </a:p>
+        </p:txBody>
+      </p:sp>
+    </p:spTree>
+    <p:extLst>
+      <p:ext uri="{BB962C8B-B14F-4D97-AF65-F5344CB8AC3E}">
+        <p14:creationId xmlns:p14="http://schemas.microsoft.com/office/powerpoint/2010/main" val="3117800749"/>
+      </p:ext>
+    </p:extLst>
+  </p:cSld>
+  <p:clrMapOvr>
+    <a:masterClrMapping/>
+  </p:clrMapOvr>
+</p:notes>
+</file>
+
+<file path=ppt/notesSlides/notesSlide15.xml><?xml version="1.0" encoding="utf-8"?>
 <p:notes xmlns:a="http://schemas.openxmlformats.org/drawingml/2006/main" xmlns:r="http://schemas.openxmlformats.org/officeDocument/2006/relationships" xmlns:p="http://schemas.openxmlformats.org/presentationml/2006/main">
   <p:cSld>
     <p:spTree>
@@ -10125,7 +10209,7 @@
             </a:r>
             <a:r>
               <a:rPr lang="en-US" sz="1400" dirty="0">
-                <a:hlinkClick r:id="rId2"/>
+                <a:hlinkClick r:id="rId3"/>
               </a:rPr>
               <a:t>Store receipt Images | Free Vectors, Stock Photos &amp; PSD (freepik.com)</a:t>
             </a:r>
@@ -10134,13 +10218,8 @@
           <a:p>
             <a:r>
               <a:rPr lang="en-US" dirty="0"/>
-              <a:t> Pic used in slide 3 </a:t>
-            </a:r>
-            <a:r>
-              <a:rPr lang="en-US"/>
-              <a:t>&amp; 10:  </a:t>
-            </a:r>
-            <a:endParaRPr lang="en-US" dirty="0"/>
+              <a:t> Pic used in slide 3 &amp; 10:  </a:t>
+            </a:r>
           </a:p>
           <a:p>
             <a:pPr marL="0" indent="0">
@@ -10152,7 +10231,7 @@
             </a:r>
             <a:r>
               <a:rPr lang="en-US" sz="1400" dirty="0">
-                <a:hlinkClick r:id="rId3"/>
+                <a:hlinkClick r:id="rId4"/>
               </a:rPr>
               <a:t>Chapter 2 Fundamental Concepts – Database Design – 2nd Edition (opentextbc.ca)</a:t>
             </a:r>

</xml_diff>